<commit_message>
Format fixes for OSDI poster
</commit_message>
<xml_diff>
--- a/presentations/ix_osdi_poster.pptx
+++ b/presentations/ix_osdi_poster.pptx
@@ -109,7 +109,7 @@
   </p:defaultTextStyle>
   <p:extLst>
     <p:ext uri="{EFAFB233-063F-42B5-8137-9DF3F51BA10A}">
-      <p15:sldGuideLst xmlns:p15="http://schemas.microsoft.com/office/powerpoint/2012/main" xmlns="">
+      <p15:sldGuideLst xmlns="" xmlns:p15="http://schemas.microsoft.com/office/powerpoint/2012/main">
         <p15:guide id="1" orient="horz" pos="11520">
           <p15:clr>
             <a:srgbClr val="A4A3A4"/>
@@ -208,7 +208,7 @@
           <a:p>
             <a:fld id="{20324BB5-C07C-4845-B203-2C5B171FEF55}" type="datetimeFigureOut">
               <a:rPr lang="en-US" smtClean="0"/>
-              <a:t>9/30/2014</a:t>
+              <a:t>2014-09-30</a:t>
             </a:fld>
             <a:endParaRPr lang="en-US" dirty="0"/>
           </a:p>
@@ -741,7 +741,7 @@
           <a:p>
             <a:fld id="{333FEEA5-1C33-A546-B0CB-742BBF77893D}" type="datetimeFigureOut">
               <a:rPr lang="en-US" smtClean="0"/>
-              <a:t>9/30/2014</a:t>
+              <a:t>2014-09-30</a:t>
             </a:fld>
             <a:endParaRPr lang="en-US" dirty="0"/>
           </a:p>
@@ -911,7 +911,7 @@
           <a:p>
             <a:fld id="{333FEEA5-1C33-A546-B0CB-742BBF77893D}" type="datetimeFigureOut">
               <a:rPr lang="en-US" smtClean="0"/>
-              <a:t>9/30/2014</a:t>
+              <a:t>2014-09-30</a:t>
             </a:fld>
             <a:endParaRPr lang="en-US" dirty="0"/>
           </a:p>
@@ -1091,7 +1091,7 @@
           <a:p>
             <a:fld id="{333FEEA5-1C33-A546-B0CB-742BBF77893D}" type="datetimeFigureOut">
               <a:rPr lang="en-US" smtClean="0"/>
-              <a:t>9/30/2014</a:t>
+              <a:t>2014-09-30</a:t>
             </a:fld>
             <a:endParaRPr lang="en-US" dirty="0"/>
           </a:p>
@@ -1261,7 +1261,7 @@
           <a:p>
             <a:fld id="{333FEEA5-1C33-A546-B0CB-742BBF77893D}" type="datetimeFigureOut">
               <a:rPr lang="en-US" smtClean="0"/>
-              <a:t>9/30/2014</a:t>
+              <a:t>2014-09-30</a:t>
             </a:fld>
             <a:endParaRPr lang="en-US" dirty="0"/>
           </a:p>
@@ -1507,7 +1507,7 @@
           <a:p>
             <a:fld id="{333FEEA5-1C33-A546-B0CB-742BBF77893D}" type="datetimeFigureOut">
               <a:rPr lang="en-US" smtClean="0"/>
-              <a:t>9/30/2014</a:t>
+              <a:t>2014-09-30</a:t>
             </a:fld>
             <a:endParaRPr lang="en-US" dirty="0"/>
           </a:p>
@@ -1795,7 +1795,7 @@
           <a:p>
             <a:fld id="{333FEEA5-1C33-A546-B0CB-742BBF77893D}" type="datetimeFigureOut">
               <a:rPr lang="en-US" smtClean="0"/>
-              <a:t>9/30/2014</a:t>
+              <a:t>2014-09-30</a:t>
             </a:fld>
             <a:endParaRPr lang="en-US" dirty="0"/>
           </a:p>
@@ -2222,7 +2222,7 @@
           <a:p>
             <a:fld id="{333FEEA5-1C33-A546-B0CB-742BBF77893D}" type="datetimeFigureOut">
               <a:rPr lang="en-US" smtClean="0"/>
-              <a:t>9/30/2014</a:t>
+              <a:t>2014-09-30</a:t>
             </a:fld>
             <a:endParaRPr lang="en-US" dirty="0"/>
           </a:p>
@@ -2340,7 +2340,7 @@
           <a:p>
             <a:fld id="{333FEEA5-1C33-A546-B0CB-742BBF77893D}" type="datetimeFigureOut">
               <a:rPr lang="en-US" smtClean="0"/>
-              <a:t>9/30/2014</a:t>
+              <a:t>2014-09-30</a:t>
             </a:fld>
             <a:endParaRPr lang="en-US" dirty="0"/>
           </a:p>
@@ -2435,7 +2435,7 @@
           <a:p>
             <a:fld id="{333FEEA5-1C33-A546-B0CB-742BBF77893D}" type="datetimeFigureOut">
               <a:rPr lang="en-US" smtClean="0"/>
-              <a:t>9/30/2014</a:t>
+              <a:t>2014-09-30</a:t>
             </a:fld>
             <a:endParaRPr lang="en-US" dirty="0"/>
           </a:p>
@@ -2712,7 +2712,7 @@
           <a:p>
             <a:fld id="{333FEEA5-1C33-A546-B0CB-742BBF77893D}" type="datetimeFigureOut">
               <a:rPr lang="en-US" smtClean="0"/>
-              <a:t>9/30/2014</a:t>
+              <a:t>2014-09-30</a:t>
             </a:fld>
             <a:endParaRPr lang="en-US" dirty="0"/>
           </a:p>
@@ -2965,7 +2965,7 @@
           <a:p>
             <a:fld id="{333FEEA5-1C33-A546-B0CB-742BBF77893D}" type="datetimeFigureOut">
               <a:rPr lang="en-US" smtClean="0"/>
-              <a:t>9/30/2014</a:t>
+              <a:t>2014-09-30</a:t>
             </a:fld>
             <a:endParaRPr lang="en-US" dirty="0"/>
           </a:p>
@@ -3178,7 +3178,7 @@
           <a:p>
             <a:fld id="{333FEEA5-1C33-A546-B0CB-742BBF77893D}" type="datetimeFigureOut">
               <a:rPr lang="en-US" smtClean="0"/>
-              <a:t>9/30/2014</a:t>
+              <a:t>2014-09-30</a:t>
             </a:fld>
             <a:endParaRPr lang="en-US" dirty="0"/>
           </a:p>
@@ -3722,7 +3722,7 @@
         <p:spPr>
           <a:xfrm>
             <a:off x="675290" y="5948009"/>
-            <a:ext cx="8944964" cy="4524315"/>
+            <a:ext cx="8944964" cy="4832092"/>
           </a:xfrm>
           <a:prstGeom prst="rect">
             <a:avLst/>
@@ -3755,15 +3755,15 @@
               <a:buAutoNum type="arabicPeriod"/>
             </a:pPr>
             <a:r>
-              <a:rPr lang="en-US" sz="3900" dirty="0" smtClean="0"/>
+              <a:rPr lang="en-US" sz="4200" dirty="0" smtClean="0"/>
               <a:t>Microsecond </a:t>
             </a:r>
             <a:r>
-              <a:rPr lang="en-US" sz="3900" dirty="0"/>
+              <a:rPr lang="en-US" sz="4200" dirty="0"/>
               <a:t>tail </a:t>
             </a:r>
             <a:r>
-              <a:rPr lang="en-US" sz="3900" dirty="0" smtClean="0"/>
+              <a:rPr lang="en-US" sz="4200" dirty="0" smtClean="0"/>
               <a:t>latency</a:t>
             </a:r>
           </a:p>
@@ -3773,18 +3773,18 @@
               <a:buAutoNum type="arabicPeriod"/>
             </a:pPr>
             <a:r>
-              <a:rPr lang="en-US" sz="3900" dirty="0" smtClean="0"/>
+              <a:rPr lang="en-US" sz="4200" dirty="0" smtClean="0"/>
               <a:t>High </a:t>
             </a:r>
             <a:r>
-              <a:rPr lang="en-US" sz="3900" dirty="0"/>
+              <a:rPr lang="en-US" sz="4200" dirty="0"/>
               <a:t>packet </a:t>
             </a:r>
             <a:r>
-              <a:rPr lang="en-US" sz="3900" dirty="0" smtClean="0"/>
+              <a:rPr lang="en-US" sz="4200" dirty="0" smtClean="0"/>
               <a:t>rates</a:t>
             </a:r>
-            <a:endParaRPr lang="en-US" sz="3900" dirty="0">
+            <a:endParaRPr lang="en-US" sz="4200" dirty="0">
               <a:solidFill>
                 <a:srgbClr val="FF0000"/>
               </a:solidFill>
@@ -3796,7 +3796,7 @@
               <a:buAutoNum type="arabicPeriod"/>
             </a:pPr>
             <a:r>
-              <a:rPr lang="en-US" sz="3900" dirty="0" smtClean="0"/>
+              <a:rPr lang="en-US" sz="4200" dirty="0" smtClean="0"/>
               <a:t>Connection scalability</a:t>
             </a:r>
           </a:p>
@@ -3806,10 +3806,10 @@
               <a:buAutoNum type="arabicPeriod"/>
             </a:pPr>
             <a:r>
-              <a:rPr lang="en-US" sz="3900" dirty="0" smtClean="0"/>
+              <a:rPr lang="en-US" sz="4200" dirty="0" smtClean="0"/>
               <a:t>Protection</a:t>
             </a:r>
-            <a:endParaRPr lang="en-US" sz="3900" dirty="0">
+            <a:endParaRPr lang="en-US" sz="4200" dirty="0">
               <a:solidFill>
                 <a:srgbClr val="FF0000"/>
               </a:solidFill>
@@ -3821,14 +3821,14 @@
               <a:buAutoNum type="arabicPeriod"/>
             </a:pPr>
             <a:r>
-              <a:rPr lang="en-US" sz="3900" dirty="0"/>
+              <a:rPr lang="en-US" sz="4200" dirty="0"/>
               <a:t>Resource </a:t>
             </a:r>
             <a:r>
-              <a:rPr lang="en-US" sz="3900" dirty="0" smtClean="0"/>
+              <a:rPr lang="en-US" sz="4200" dirty="0" smtClean="0"/>
               <a:t>efficiency</a:t>
             </a:r>
-            <a:endParaRPr lang="en-US" sz="3900" dirty="0"/>
+            <a:endParaRPr lang="en-US" sz="4200" dirty="0"/>
           </a:p>
           <a:p>
             <a:pPr algn="ctr"/>
@@ -3845,7 +3845,7 @@
         <p:spPr>
           <a:xfrm>
             <a:off x="18293011" y="5925253"/>
-            <a:ext cx="8376988" cy="4970591"/>
+            <a:ext cx="8376988" cy="4770537"/>
           </a:xfrm>
           <a:prstGeom prst="rect">
             <a:avLst/>
@@ -3865,8 +3865,21 @@
                   <a:srgbClr val="C00000"/>
                 </a:solidFill>
               </a:rPr>
-              <a:t>Current Approaches</a:t>
-            </a:r>
+              <a:t>Current </a:t>
+            </a:r>
+            <a:r>
+              <a:rPr lang="en-US" sz="4400" dirty="0" smtClean="0">
+                <a:solidFill>
+                  <a:srgbClr val="C00000"/>
+                </a:solidFill>
+              </a:rPr>
+              <a:t>Approaches</a:t>
+            </a:r>
+            <a:endParaRPr lang="en-US" sz="800" dirty="0" smtClean="0">
+              <a:solidFill>
+                <a:srgbClr val="C00000"/>
+              </a:solidFill>
+            </a:endParaRPr>
           </a:p>
           <a:p>
             <a:pPr marL="457200" indent="-457200">
@@ -3874,7 +3887,7 @@
               <a:buChar char="•"/>
             </a:pPr>
             <a:r>
-              <a:rPr lang="en-US" sz="3900" b="1" dirty="0" smtClean="0"/>
+              <a:rPr lang="en-US" sz="4200" b="1" dirty="0" smtClean="0"/>
               <a:t>Bypass the kernel</a:t>
             </a:r>
           </a:p>
@@ -3884,7 +3897,7 @@
               <a:buChar char="•"/>
             </a:pPr>
             <a:r>
-              <a:rPr lang="en-US" sz="3900" dirty="0" smtClean="0"/>
+              <a:rPr lang="en-US" sz="4200" dirty="0" smtClean="0"/>
               <a:t>User-level stack (e.g. mTCP)</a:t>
             </a:r>
           </a:p>
@@ -3894,7 +3907,7 @@
               <a:buChar char="•"/>
             </a:pPr>
             <a:r>
-              <a:rPr lang="en-US" sz="3900" dirty="0" smtClean="0"/>
+              <a:rPr lang="en-US" sz="4200" dirty="0" smtClean="0"/>
               <a:t>Offload to HW (e.g. RDMA, TOE)</a:t>
             </a:r>
           </a:p>
@@ -3904,9 +3917,14 @@
               <a:buChar char="•"/>
             </a:pPr>
             <a:r>
-              <a:rPr lang="en-US" sz="3900" dirty="0" smtClean="0"/>
-              <a:t>Replace TCP (e.g. UDP, Infiniband)</a:t>
-            </a:r>
+              <a:rPr lang="en-US" sz="4200" dirty="0" smtClean="0"/>
+              <a:t>Replace TCP (e.g. </a:t>
+            </a:r>
+            <a:r>
+              <a:rPr lang="en-US" sz="4200" dirty="0" smtClean="0"/>
+              <a:t>UDP)</a:t>
+            </a:r>
+            <a:endParaRPr lang="en-US" sz="4200" dirty="0" smtClean="0"/>
           </a:p>
           <a:p>
             <a:pPr marL="457200" indent="-457200">
@@ -3914,18 +3932,18 @@
               <a:buChar char="•"/>
             </a:pPr>
             <a:r>
-              <a:rPr lang="en-US" sz="3900" dirty="0" smtClean="0"/>
+              <a:rPr lang="en-US" sz="4200" dirty="0" smtClean="0"/>
               <a:t>User-level networking and TCP alternatives </a:t>
             </a:r>
             <a:r>
-              <a:rPr lang="en-US" sz="3900" b="1" dirty="0" smtClean="0"/>
-              <a:t>sacrifice security </a:t>
-            </a:r>
-            <a:r>
-              <a:rPr lang="en-US" sz="3900" dirty="0" smtClean="0"/>
-              <a:t>and limit policy enforcement</a:t>
-            </a:r>
-            <a:endParaRPr lang="en-US" sz="3900" dirty="0" smtClean="0">
+              <a:rPr lang="en-US" sz="4200" b="1" dirty="0"/>
+              <a:t>s</a:t>
+            </a:r>
+            <a:r>
+              <a:rPr lang="en-US" sz="4200" b="1" dirty="0" smtClean="0"/>
+              <a:t>acrifice security</a:t>
+            </a:r>
+            <a:endParaRPr lang="en-US" sz="4200" dirty="0" smtClean="0">
               <a:solidFill>
                 <a:srgbClr val="000000"/>
               </a:solidFill>
@@ -3972,7 +3990,7 @@
         <p:spPr>
           <a:xfrm>
             <a:off x="862632" y="11153031"/>
-            <a:ext cx="8757622" cy="6848029"/>
+            <a:ext cx="8811846" cy="5539978"/>
           </a:xfrm>
           <a:prstGeom prst="rect">
             <a:avLst/>
@@ -3992,35 +4010,70 @@
                   <a:srgbClr val="0132BB"/>
                 </a:solidFill>
               </a:rPr>
-              <a:t>Introducing IX</a:t>
-            </a:r>
-          </a:p>
-          <a:p>
-            <a:r>
-              <a:rPr lang="en-US" sz="3900" b="1" dirty="0" smtClean="0"/>
-              <a:t> IX </a:t>
-            </a:r>
-            <a:r>
-              <a:rPr lang="en-US" sz="3900" b="1" dirty="0"/>
-              <a:t>reconciles security </a:t>
-            </a:r>
-            <a:r>
-              <a:rPr lang="en-US" sz="3900" b="1" dirty="0" smtClean="0"/>
-              <a:t>and performance</a:t>
-            </a:r>
-            <a:endParaRPr lang="en-US" sz="3900" b="1" dirty="0"/>
+              <a:t>Introducing </a:t>
+            </a:r>
+            <a:r>
+              <a:rPr lang="en-US" sz="4400" dirty="0" smtClean="0">
+                <a:solidFill>
+                  <a:srgbClr val="0132BB"/>
+                </a:solidFill>
+              </a:rPr>
+              <a:t>IX</a:t>
+            </a:r>
+          </a:p>
+          <a:p>
+            <a:pPr indent="-1371600" algn="ctr"/>
+            <a:endParaRPr lang="en-US" sz="1200" dirty="0" smtClean="0">
+              <a:solidFill>
+                <a:srgbClr val="0132BB"/>
+              </a:solidFill>
+            </a:endParaRPr>
+          </a:p>
+          <a:p>
+            <a:r>
+              <a:rPr lang="en-US" sz="4400" b="1" dirty="0" smtClean="0"/>
+              <a:t> </a:t>
+            </a:r>
+            <a:r>
+              <a:rPr lang="en-US" sz="4200" b="1" dirty="0" smtClean="0"/>
+              <a:t>IX </a:t>
+            </a:r>
+            <a:r>
+              <a:rPr lang="en-US" sz="4200" b="1" dirty="0" smtClean="0"/>
+              <a:t>provides security </a:t>
+            </a:r>
+            <a:r>
+              <a:rPr lang="en-US" sz="4200" b="1" dirty="0" smtClean="0"/>
+              <a:t>and </a:t>
+            </a:r>
+            <a:r>
+              <a:rPr lang="en-US" sz="4200" b="1" dirty="0" smtClean="0"/>
+              <a:t>performance:</a:t>
+            </a:r>
+            <a:endParaRPr lang="en-US" sz="4200" b="1" dirty="0"/>
           </a:p>
           <a:p>
             <a:pPr marL="914400" lvl="1" indent="-457200">
               <a:buFont typeface="Arial"/>
               <a:buChar char="•"/>
             </a:pPr>
-            <a:r>
-              <a:rPr lang="en-US" sz="3900" dirty="0" smtClean="0"/>
-              <a:t>Implements a</a:t>
-            </a:r>
-            <a:r>
-              <a:rPr lang="en-US" sz="3900" b="1" dirty="0" smtClean="0">
+            <a:endParaRPr lang="en-US" sz="1200" dirty="0" smtClean="0"/>
+          </a:p>
+          <a:p>
+            <a:pPr marL="914400" lvl="1" indent="-457200">
+              <a:buFont typeface="Arial"/>
+              <a:buChar char="•"/>
+            </a:pPr>
+            <a:r>
+              <a:rPr lang="en-US" sz="4200" dirty="0" smtClean="0"/>
+              <a:t>Implements </a:t>
+            </a:r>
+            <a:r>
+              <a:rPr lang="en-US" sz="4200" dirty="0" smtClean="0"/>
+              <a:t>a</a:t>
+            </a:r>
+            <a:r>
+              <a:rPr lang="en-US" sz="4200" b="1" dirty="0" smtClean="0">
                 <a:solidFill>
                   <a:srgbClr val="800000"/>
                 </a:solidFill>
@@ -4028,11 +4081,11 @@
               <a:t> </a:t>
             </a:r>
             <a:r>
-              <a:rPr lang="en-US" sz="3900" i="1" dirty="0" smtClean="0"/>
+              <a:rPr lang="en-US" sz="4200" i="1" dirty="0" smtClean="0"/>
               <a:t>full TCP </a:t>
             </a:r>
             <a:r>
-              <a:rPr lang="en-US" sz="3900" i="1" dirty="0" smtClean="0">
+              <a:rPr lang="en-US" sz="4200" i="1" dirty="0" smtClean="0">
                 <a:solidFill>
                   <a:srgbClr val="000000"/>
                 </a:solidFill>
@@ -4040,13 +4093,26 @@
               <a:t>stack</a:t>
             </a:r>
             <a:r>
-              <a:rPr lang="en-US" sz="3900" dirty="0" smtClean="0">
+              <a:rPr lang="en-US" sz="4200" dirty="0" smtClean="0">
                 <a:solidFill>
                   <a:srgbClr val="000000"/>
                 </a:solidFill>
               </a:rPr>
-              <a:t> in dataplane, protected from application</a:t>
-            </a:r>
+              <a:t> in dataplane, protected from </a:t>
+            </a:r>
+            <a:r>
+              <a:rPr lang="en-US" sz="4200" dirty="0" smtClean="0">
+                <a:solidFill>
+                  <a:srgbClr val="000000"/>
+                </a:solidFill>
+              </a:rPr>
+              <a:t>app</a:t>
+            </a:r>
+            <a:endParaRPr lang="en-US" sz="4200" dirty="0" smtClean="0">
+              <a:solidFill>
+                <a:srgbClr val="000000"/>
+              </a:solidFill>
+            </a:endParaRPr>
           </a:p>
           <a:p>
             <a:pPr marL="914400" lvl="1" indent="-457200">
@@ -4054,7 +4120,7 @@
               <a:buChar char="•"/>
             </a:pPr>
             <a:r>
-              <a:rPr lang="en-US" sz="3900" dirty="0" smtClean="0">
+              <a:rPr lang="en-US" sz="4200" dirty="0" smtClean="0">
                 <a:solidFill>
                   <a:srgbClr val="000000"/>
                 </a:solidFill>
@@ -4062,20 +4128,28 @@
               <a:t>Saturates </a:t>
             </a:r>
             <a:r>
-              <a:rPr lang="en-US" sz="3900" dirty="0">
+              <a:rPr lang="en-US" sz="4200" dirty="0">
                 <a:solidFill>
                   <a:srgbClr val="000000"/>
                 </a:solidFill>
               </a:rPr>
-              <a:t>10 GbE NICs with </a:t>
-            </a:r>
-            <a:r>
-              <a:rPr lang="en-US" sz="3900" dirty="0" smtClean="0">
+              <a:t>10 GbE NICs </a:t>
+            </a:r>
+            <a:r>
+              <a:rPr lang="en-US" sz="4200" dirty="0" smtClean="0">
                 <a:solidFill>
                   <a:srgbClr val="000000"/>
                 </a:solidFill>
               </a:rPr>
-              <a:t>64B msgs</a:t>
+              <a:t>w/64B </a:t>
+            </a:r>
+            <a:r>
+              <a:rPr lang="en-US" sz="4200" dirty="0" smtClean="0">
+                <a:solidFill>
+                  <a:srgbClr val="000000"/>
+                </a:solidFill>
+              </a:rPr>
+              <a:t>msgs</a:t>
             </a:r>
           </a:p>
           <a:p>
@@ -4084,99 +4158,21 @@
               <a:buChar char="•"/>
             </a:pPr>
             <a:r>
-              <a:rPr lang="en-US" sz="3900" dirty="0" smtClean="0">
+              <a:rPr lang="en-US" sz="4200" dirty="0" smtClean="0">
                 <a:solidFill>
                   <a:srgbClr val="000000"/>
                 </a:solidFill>
               </a:rPr>
               <a:t>Saturates up to 4 x 10 GbE interfaces with a single socket</a:t>
             </a:r>
-            <a:endParaRPr lang="en-US" sz="3900" dirty="0">
+            <a:endParaRPr lang="en-US" sz="4200" dirty="0">
               <a:solidFill>
                 <a:srgbClr val="000000"/>
               </a:solidFill>
             </a:endParaRPr>
           </a:p>
           <a:p>
-            <a:pPr marL="914400" lvl="1" indent="-457200">
-              <a:buFont typeface="Arial"/>
-              <a:buChar char="•"/>
-            </a:pPr>
-            <a:r>
-              <a:rPr lang="en-US" sz="3900" dirty="0" smtClean="0">
-                <a:solidFill>
-                  <a:srgbClr val="000000"/>
-                </a:solidFill>
-              </a:rPr>
-              <a:t>Achieves </a:t>
-            </a:r>
-            <a:r>
-              <a:rPr lang="en-US" sz="3900" dirty="0">
-                <a:solidFill>
-                  <a:srgbClr val="000000"/>
-                </a:solidFill>
-              </a:rPr>
-              <a:t>up to </a:t>
-            </a:r>
-            <a:r>
-              <a:rPr lang="en-US" sz="3900" b="1" dirty="0" smtClean="0">
-                <a:solidFill>
-                  <a:srgbClr val="000000"/>
-                </a:solidFill>
-              </a:rPr>
-              <a:t>3.6x</a:t>
-            </a:r>
-            <a:r>
-              <a:rPr lang="en-US" sz="3900" dirty="0" smtClean="0">
-                <a:solidFill>
-                  <a:srgbClr val="000000"/>
-                </a:solidFill>
-              </a:rPr>
-              <a:t> </a:t>
-            </a:r>
-            <a:r>
-              <a:rPr lang="en-US" sz="3900" dirty="0">
-                <a:solidFill>
-                  <a:srgbClr val="000000"/>
-                </a:solidFill>
-              </a:rPr>
-              <a:t>more RPS and </a:t>
-            </a:r>
-            <a:r>
-              <a:rPr lang="en-US" sz="3900" b="1" dirty="0">
-                <a:solidFill>
-                  <a:srgbClr val="000000"/>
-                </a:solidFill>
-              </a:rPr>
-              <a:t>2x</a:t>
-            </a:r>
-            <a:r>
-              <a:rPr lang="en-US" sz="3900" dirty="0">
-                <a:solidFill>
-                  <a:srgbClr val="000000"/>
-                </a:solidFill>
-              </a:rPr>
-              <a:t> less tail latency compared to </a:t>
-            </a:r>
-            <a:r>
-              <a:rPr lang="en-US" sz="3900" dirty="0" smtClean="0">
-                <a:solidFill>
-                  <a:srgbClr val="000000"/>
-                </a:solidFill>
-              </a:rPr>
-              <a:t>Linux for Memcached workloads</a:t>
-            </a:r>
-            <a:endParaRPr lang="en-US" sz="3900" dirty="0">
-              <a:solidFill>
-                <a:srgbClr val="000000"/>
-              </a:solidFill>
-            </a:endParaRPr>
-          </a:p>
-          <a:p>
-            <a:pPr marL="914400" lvl="1" indent="-457200">
-              <a:buFont typeface="Arial"/>
-              <a:buChar char="•"/>
-            </a:pPr>
+            <a:pPr marL="457200" lvl="1"/>
             <a:endParaRPr lang="en-US" sz="3200" dirty="0" smtClean="0"/>
           </a:p>
         </p:txBody>
@@ -4190,7 +4186,7 @@
         <p:spPr>
           <a:xfrm>
             <a:off x="18311298" y="11189023"/>
-            <a:ext cx="8606352" cy="6355586"/>
+            <a:ext cx="8606352" cy="5478422"/>
           </a:xfrm>
           <a:prstGeom prst="rect">
             <a:avLst/>
@@ -4210,8 +4206,24 @@
                   <a:srgbClr val="0132BB"/>
                 </a:solidFill>
               </a:rPr>
-              <a:t>Separation of Control and Data</a:t>
-            </a:r>
+              <a:t>Separation of Control and </a:t>
+            </a:r>
+            <a:r>
+              <a:rPr lang="en-US" sz="4400" dirty="0" smtClean="0">
+                <a:solidFill>
+                  <a:srgbClr val="0132BB"/>
+                </a:solidFill>
+              </a:rPr>
+              <a:t>Data</a:t>
+            </a:r>
+          </a:p>
+          <a:p>
+            <a:pPr algn="ctr"/>
+            <a:endParaRPr lang="en-US" sz="1200" dirty="0" smtClean="0">
+              <a:solidFill>
+                <a:srgbClr val="0132BB"/>
+              </a:solidFill>
+            </a:endParaRPr>
           </a:p>
           <a:p>
             <a:pPr marL="457200" indent="-457200">
@@ -4219,7 +4231,7 @@
               <a:buChar char="•"/>
             </a:pPr>
             <a:r>
-              <a:rPr lang="en-US" sz="3900" b="1" dirty="0" smtClean="0"/>
+              <a:rPr lang="en-US" sz="4200" b="1" dirty="0" smtClean="0"/>
               <a:t>Linux control plane</a:t>
             </a:r>
           </a:p>
@@ -4229,8 +4241,23 @@
               <a:buChar char="•"/>
             </a:pPr>
             <a:r>
-              <a:rPr lang="en-US" sz="3900" dirty="0" smtClean="0"/>
-              <a:t>Course-grained resource management (e.g. network queues)</a:t>
+              <a:rPr lang="en-US" sz="4200" dirty="0" smtClean="0"/>
+              <a:t>Course-grained resource mgmt.</a:t>
+            </a:r>
+            <a:endParaRPr lang="en-US" sz="4200" dirty="0" smtClean="0"/>
+          </a:p>
+          <a:p>
+            <a:pPr marL="457200" indent="-457200">
+              <a:buFont typeface="Arial"/>
+              <a:buChar char="•"/>
+            </a:pPr>
+            <a:r>
+              <a:rPr lang="en-US" sz="4200" b="1" dirty="0" smtClean="0"/>
+              <a:t>IX </a:t>
+            </a:r>
+            <a:r>
+              <a:rPr lang="en-US" sz="4200" b="1" dirty="0" smtClean="0"/>
+              <a:t>data plane (powered by Dune)</a:t>
             </a:r>
           </a:p>
           <a:p>
@@ -4239,10 +4266,24 @@
               <a:buChar char="•"/>
             </a:pPr>
             <a:r>
-              <a:rPr lang="en-US" sz="3900" dirty="0" smtClean="0"/>
-              <a:t>Performs load balancing</a:t>
-            </a:r>
-            <a:endParaRPr lang="en-US" sz="3900" dirty="0"/>
+              <a:rPr lang="en-US" sz="4200" dirty="0"/>
+              <a:t>Inspired by network </a:t>
+            </a:r>
+            <a:r>
+              <a:rPr lang="en-US" sz="4200" dirty="0" err="1" smtClean="0"/>
+              <a:t>middleboxes</a:t>
+            </a:r>
+            <a:endParaRPr lang="en-US" sz="4200" dirty="0" smtClean="0"/>
+          </a:p>
+          <a:p>
+            <a:pPr marL="914400" lvl="1" indent="-457200">
+              <a:buFont typeface="Arial"/>
+              <a:buChar char="•"/>
+            </a:pPr>
+            <a:r>
+              <a:rPr lang="en-US" sz="4200" dirty="0" smtClean="0"/>
+              <a:t>A custom single-app OS for high performance networking </a:t>
+            </a:r>
           </a:p>
           <a:p>
             <a:pPr marL="457200" indent="-457200">
@@ -4250,42 +4291,7 @@
               <a:buChar char="•"/>
             </a:pPr>
             <a:r>
-              <a:rPr lang="en-US" sz="3900" b="1" dirty="0" smtClean="0"/>
-              <a:t>IX data plane (powered by Dune)</a:t>
-            </a:r>
-          </a:p>
-          <a:p>
-            <a:pPr marL="914400" lvl="1" indent="-457200">
-              <a:buFont typeface="Arial"/>
-              <a:buChar char="•"/>
-            </a:pPr>
-            <a:r>
-              <a:rPr lang="en-US" sz="3900" dirty="0"/>
-              <a:t>Inspired by network </a:t>
-            </a:r>
-            <a:r>
-              <a:rPr lang="en-US" sz="3900" dirty="0" err="1" smtClean="0"/>
-              <a:t>middleboxes</a:t>
-            </a:r>
-            <a:endParaRPr lang="en-US" sz="3900" dirty="0" smtClean="0"/>
-          </a:p>
-          <a:p>
-            <a:pPr marL="914400" lvl="1" indent="-457200">
-              <a:buFont typeface="Arial"/>
-              <a:buChar char="•"/>
-            </a:pPr>
-            <a:r>
-              <a:rPr lang="en-US" sz="3900" dirty="0" smtClean="0"/>
-              <a:t>A custom single-app OS for high performance networking </a:t>
-            </a:r>
-          </a:p>
-          <a:p>
-            <a:pPr marL="457200" indent="-457200">
-              <a:buFont typeface="Arial"/>
-              <a:buChar char="•"/>
-            </a:pPr>
-            <a:r>
-              <a:rPr lang="en-US" sz="3900" b="1" dirty="0" smtClean="0"/>
+              <a:rPr lang="en-US" sz="4200" b="1" dirty="0" smtClean="0"/>
               <a:t>Three-way isolation: App, DP, CP</a:t>
             </a:r>
           </a:p>
@@ -4329,8 +4335,8 @@
         </p:nvSpPr>
         <p:spPr>
           <a:xfrm>
-            <a:off x="18329324" y="17622928"/>
-            <a:ext cx="8340675" cy="6170920"/>
+            <a:off x="18278524" y="17622928"/>
+            <a:ext cx="8639126" cy="6124753"/>
           </a:xfrm>
           <a:prstGeom prst="rect">
             <a:avLst/>
@@ -4350,8 +4356,24 @@
                   <a:srgbClr val="0132BB"/>
                 </a:solidFill>
               </a:rPr>
-              <a:t>Results Summary</a:t>
-            </a:r>
+              <a:t>Results </a:t>
+            </a:r>
+            <a:r>
+              <a:rPr lang="en-US" sz="4400" dirty="0" smtClean="0">
+                <a:solidFill>
+                  <a:srgbClr val="0132BB"/>
+                </a:solidFill>
+              </a:rPr>
+              <a:t>Summary</a:t>
+            </a:r>
+          </a:p>
+          <a:p>
+            <a:pPr algn="ctr"/>
+            <a:endParaRPr lang="en-US" sz="1200" dirty="0" smtClean="0">
+              <a:solidFill>
+                <a:srgbClr val="0132BB"/>
+              </a:solidFill>
+            </a:endParaRPr>
           </a:p>
           <a:p>
             <a:pPr marL="385763" indent="-385763">
@@ -4359,35 +4381,47 @@
               <a:buChar char="•"/>
             </a:pPr>
             <a:r>
-              <a:rPr lang="en-US" sz="3900" dirty="0" smtClean="0"/>
+              <a:rPr lang="en-US" sz="4200" dirty="0" smtClean="0"/>
               <a:t>Outperforms </a:t>
             </a:r>
             <a:r>
-              <a:rPr lang="en-US" sz="3900" dirty="0"/>
+              <a:rPr lang="en-US" sz="4200" dirty="0"/>
               <a:t>Linux </a:t>
             </a:r>
             <a:r>
-              <a:rPr lang="en-US" sz="3900" dirty="0" smtClean="0"/>
+              <a:rPr lang="en-US" sz="4200" dirty="0" smtClean="0"/>
               <a:t>by </a:t>
             </a:r>
             <a:r>
-              <a:rPr lang="en-US" sz="3900" b="1" dirty="0" smtClean="0"/>
+              <a:rPr lang="en-US" sz="4200" b="1" dirty="0" smtClean="0"/>
               <a:t>10× </a:t>
             </a:r>
             <a:r>
-              <a:rPr lang="en-US" sz="3900" dirty="0" smtClean="0"/>
-              <a:t>and mTCP by </a:t>
-            </a:r>
-            <a:r>
-              <a:rPr lang="en-US" sz="3900" b="1" dirty="0" smtClean="0"/>
+              <a:rPr lang="en-US" sz="4200" dirty="0" smtClean="0"/>
+              <a:t>and   </a:t>
+            </a:r>
+            <a:r>
+              <a:rPr lang="en-US" sz="4200" dirty="0" err="1" smtClean="0"/>
+              <a:t>mTCP</a:t>
+            </a:r>
+            <a:r>
+              <a:rPr lang="en-US" sz="4200" dirty="0" smtClean="0"/>
+              <a:t> </a:t>
+            </a:r>
+            <a:r>
+              <a:rPr lang="en-US" sz="4200" dirty="0" smtClean="0"/>
+              <a:t>by </a:t>
+            </a:r>
+            <a:r>
+              <a:rPr lang="en-US" sz="4200" b="1" dirty="0" smtClean="0"/>
               <a:t>1.9× </a:t>
             </a:r>
             <a:r>
-              <a:rPr lang="en-US" sz="3900" dirty="0" smtClean="0"/>
+              <a:rPr lang="en-US" sz="4200" dirty="0" smtClean="0"/>
               <a:t>for </a:t>
             </a:r>
             <a:r>
-              <a:rPr lang="en-US" sz="3900" dirty="0"/>
+              <a:rPr lang="en-US" sz="4200" dirty="0"/>
               <a:t>throughput</a:t>
             </a:r>
           </a:p>
@@ -4397,24 +4431,47 @@
               <a:buChar char="•"/>
             </a:pPr>
             <a:r>
-              <a:rPr lang="en-US" sz="3900" dirty="0" smtClean="0"/>
-              <a:t>Achieves unloaded uni-dir. </a:t>
-            </a:r>
-            <a:r>
-              <a:rPr lang="en-US" sz="3900" dirty="0"/>
+              <a:rPr lang="en-US" sz="4200" dirty="0"/>
+              <a:t>U</a:t>
+            </a:r>
+            <a:r>
+              <a:rPr lang="en-US" sz="4200" dirty="0" smtClean="0"/>
+              <a:t>nloaded </a:t>
+            </a:r>
+            <a:r>
+              <a:rPr lang="en-US" sz="4200" dirty="0" smtClean="0"/>
+              <a:t>uni-dir. </a:t>
+            </a:r>
+            <a:r>
+              <a:rPr lang="en-US" sz="4200" dirty="0"/>
               <a:t>latency </a:t>
             </a:r>
             <a:r>
-              <a:rPr lang="en-US" sz="3900" dirty="0" smtClean="0"/>
-              <a:t>of </a:t>
-            </a:r>
-            <a:r>
-              <a:rPr lang="en-US" sz="3900" b="1" dirty="0" smtClean="0"/>
+              <a:rPr lang="en-US" sz="4200" dirty="0" smtClean="0"/>
+              <a:t>is </a:t>
+            </a:r>
+            <a:r>
+              <a:rPr lang="en-US" sz="4200" b="1" dirty="0" smtClean="0"/>
               <a:t>5.7µs</a:t>
             </a:r>
-            <a:r>
-              <a:rPr lang="en-US" sz="3900" dirty="0" smtClean="0"/>
-              <a:t>, 4× better than Linux, an order of magnitude better than mTCP</a:t>
+            <a:endParaRPr lang="en-US" sz="4200" dirty="0" smtClean="0"/>
+          </a:p>
+          <a:p>
+            <a:pPr marL="965200" lvl="1" indent="-355600">
+              <a:buFont typeface="Arial" panose="020B0604020202020204" pitchFamily="34" charset="0"/>
+              <a:buChar char="•"/>
+            </a:pPr>
+            <a:r>
+              <a:rPr lang="en-US" sz="4200" dirty="0" smtClean="0"/>
+              <a:t>4</a:t>
+            </a:r>
+            <a:r>
+              <a:rPr lang="en-US" sz="4200" dirty="0" smtClean="0"/>
+              <a:t>× better than </a:t>
+            </a:r>
+            <a:r>
+              <a:rPr lang="en-US" sz="4200" dirty="0" smtClean="0"/>
+              <a:t>Linux</a:t>
             </a:r>
           </a:p>
           <a:p>
@@ -4423,23 +4480,23 @@
               <a:buChar char="•"/>
             </a:pPr>
             <a:r>
-              <a:rPr lang="en-US" sz="3900" dirty="0" smtClean="0"/>
+              <a:rPr lang="en-US" sz="4200" dirty="0" smtClean="0"/>
               <a:t>Scales </a:t>
             </a:r>
             <a:r>
-              <a:rPr lang="en-US" sz="3900" dirty="0"/>
+              <a:rPr lang="en-US" sz="4200" dirty="0"/>
               <a:t>to 10</a:t>
             </a:r>
             <a:r>
-              <a:rPr lang="en-US" sz="3900" baseline="30000" dirty="0"/>
+              <a:rPr lang="en-US" sz="4200" baseline="30000" dirty="0"/>
               <a:t>5</a:t>
             </a:r>
             <a:r>
-              <a:rPr lang="en-US" sz="3900" dirty="0"/>
+              <a:rPr lang="en-US" sz="4200" dirty="0"/>
               <a:t>-order </a:t>
             </a:r>
             <a:r>
-              <a:rPr lang="en-US" sz="3900" dirty="0" smtClean="0"/>
+              <a:rPr lang="en-US" sz="4200" dirty="0" smtClean="0"/>
               <a:t>connections</a:t>
             </a:r>
           </a:p>
@@ -4449,7 +4506,7 @@
               <a:buChar char="•"/>
             </a:pPr>
             <a:r>
-              <a:rPr lang="en-US" sz="3900" dirty="0" smtClean="0"/>
+              <a:rPr lang="en-US" sz="4200" dirty="0" smtClean="0"/>
               <a:t>Memcached with IX versus Linux:</a:t>
             </a:r>
           </a:p>
@@ -4459,31 +4516,31 @@
               <a:buChar char="•"/>
             </a:pPr>
             <a:r>
-              <a:rPr lang="en-US" sz="3900" dirty="0" smtClean="0"/>
-              <a:t>Up </a:t>
-            </a:r>
-            <a:r>
-              <a:rPr lang="en-US" sz="3900" dirty="0"/>
-              <a:t>to </a:t>
-            </a:r>
-            <a:r>
-              <a:rPr lang="en-US" sz="3900" b="1" dirty="0" smtClean="0"/>
-              <a:t>3.6×</a:t>
-            </a:r>
-            <a:r>
-              <a:rPr lang="en-US" sz="3900" dirty="0"/>
+              <a:rPr lang="en-US" sz="4200" b="1" dirty="0" smtClean="0"/>
+              <a:t>3.6</a:t>
+            </a:r>
+            <a:r>
+              <a:rPr lang="en-US" sz="4200" b="1" dirty="0" smtClean="0"/>
+              <a:t>×</a:t>
+            </a:r>
+            <a:r>
+              <a:rPr lang="en-US" sz="4200" dirty="0"/>
               <a:t> </a:t>
             </a:r>
             <a:r>
-              <a:rPr lang="en-US" sz="3900" dirty="0" smtClean="0"/>
-              <a:t>RPS, </a:t>
-            </a:r>
-            <a:r>
-              <a:rPr lang="en-US" sz="3900" b="1" dirty="0" smtClean="0"/>
+              <a:rPr lang="en-US" sz="4200" dirty="0" smtClean="0"/>
+              <a:t>RPS</a:t>
+            </a:r>
+            <a:r>
+              <a:rPr lang="en-US" sz="4200" dirty="0" smtClean="0"/>
+              <a:t>, </a:t>
+            </a:r>
+            <a:r>
+              <a:rPr lang="en-US" sz="4200" b="1" dirty="0" smtClean="0"/>
               <a:t>2×</a:t>
             </a:r>
             <a:r>
-              <a:rPr lang="en-US" sz="3900" dirty="0" smtClean="0"/>
+              <a:rPr lang="en-US" sz="4200" dirty="0" smtClean="0"/>
               <a:t> less tail latency</a:t>
             </a:r>
           </a:p>
@@ -4493,7 +4550,7 @@
               <a:buChar char="•"/>
             </a:pPr>
             <a:r>
-              <a:rPr lang="en-US" sz="3900" dirty="0" smtClean="0"/>
+              <a:rPr lang="en-US" sz="4200" dirty="0" smtClean="0"/>
               <a:t>% kernel time &lt; 10% vs. ~75%</a:t>
             </a:r>
           </a:p>
@@ -5170,7 +5227,7 @@
         <p:spPr>
           <a:xfrm>
             <a:off x="1059481" y="17621108"/>
-            <a:ext cx="9357052" cy="6170920"/>
+            <a:ext cx="9357052" cy="6124753"/>
           </a:xfrm>
           <a:prstGeom prst="rect">
             <a:avLst/>
@@ -5190,8 +5247,24 @@
                   <a:srgbClr val="0132BB"/>
                 </a:solidFill>
               </a:rPr>
-              <a:t>IX Design Principles</a:t>
-            </a:r>
+              <a:t>IX Design </a:t>
+            </a:r>
+            <a:r>
+              <a:rPr lang="en-US" sz="4400" dirty="0" smtClean="0">
+                <a:solidFill>
+                  <a:srgbClr val="0132BB"/>
+                </a:solidFill>
+              </a:rPr>
+              <a:t>Principles</a:t>
+            </a:r>
+          </a:p>
+          <a:p>
+            <a:pPr algn="ctr"/>
+            <a:endParaRPr lang="en-US" sz="800" dirty="0" smtClean="0">
+              <a:solidFill>
+                <a:srgbClr val="0132BB"/>
+              </a:solidFill>
+            </a:endParaRPr>
           </a:p>
           <a:p>
             <a:pPr marL="514350" indent="-514350">
@@ -5199,7 +5272,7 @@
               <a:buAutoNum type="arabicPeriod"/>
             </a:pPr>
             <a:r>
-              <a:rPr lang="en-US" sz="3900" b="1" dirty="0" smtClean="0"/>
+              <a:rPr lang="en-US" sz="4200" b="1" dirty="0" smtClean="0"/>
               <a:t>Run to completion</a:t>
             </a:r>
           </a:p>
@@ -5209,7 +5282,7 @@
               <a:buChar char="•"/>
             </a:pPr>
             <a:r>
-              <a:rPr lang="en-US" sz="3900" dirty="0" smtClean="0"/>
+              <a:rPr lang="en-US" sz="4200" dirty="0" smtClean="0"/>
               <a:t>Improve D-cache behavior</a:t>
             </a:r>
           </a:p>
@@ -5219,7 +5292,7 @@
               <a:buAutoNum type="arabicPeriod"/>
             </a:pPr>
             <a:r>
-              <a:rPr lang="en-US" sz="3900" b="1" dirty="0" smtClean="0"/>
+              <a:rPr lang="en-US" sz="4200" b="1" dirty="0" smtClean="0"/>
               <a:t>Adaptive batching</a:t>
             </a:r>
           </a:p>
@@ -5229,17 +5302,22 @@
               <a:buChar char="•"/>
             </a:pPr>
             <a:r>
-              <a:rPr lang="en-US" sz="3900" dirty="0" smtClean="0"/>
-              <a:t>Ensure low jitter by batching only     during </a:t>
-            </a:r>
-            <a:r>
-              <a:rPr lang="en-US" sz="3900" i="1" dirty="0" smtClean="0"/>
-              <a:t>congestion</a:t>
-            </a:r>
-            <a:r>
-              <a:rPr lang="en-US" sz="3900" dirty="0" smtClean="0"/>
+              <a:rPr lang="en-US" sz="4200" dirty="0"/>
+              <a:t>L</a:t>
+            </a:r>
+            <a:r>
+              <a:rPr lang="en-US" sz="4200" dirty="0" smtClean="0"/>
+              <a:t>ow jitter; batch only when </a:t>
+            </a:r>
+            <a:r>
+              <a:rPr lang="en-US" sz="4200" i="1" dirty="0" smtClean="0"/>
+              <a:t>congested</a:t>
+            </a:r>
+            <a:r>
+              <a:rPr lang="en-US" sz="4200" dirty="0" smtClean="0"/>
               <a:t> </a:t>
             </a:r>
+            <a:endParaRPr lang="en-US" sz="4200" dirty="0" smtClean="0"/>
           </a:p>
           <a:p>
             <a:pPr marL="514350" indent="-514350">
@@ -5247,7 +5325,7 @@
               <a:buAutoNum type="arabicPeriod"/>
             </a:pPr>
             <a:r>
-              <a:rPr lang="en-US" sz="3900" b="1" dirty="0" smtClean="0"/>
+              <a:rPr lang="en-US" sz="4200" b="1" dirty="0" smtClean="0"/>
               <a:t>Native zero copy API</a:t>
             </a:r>
           </a:p>
@@ -5257,8 +5335,16 @@
               <a:buChar char="•"/>
             </a:pPr>
             <a:r>
-              <a:rPr lang="en-US" sz="3900" dirty="0" smtClean="0"/>
-              <a:t>Maximize programming model flexibility</a:t>
+              <a:rPr lang="en-US" sz="4200" dirty="0"/>
+              <a:t>P</a:t>
+            </a:r>
+            <a:r>
+              <a:rPr lang="en-US" sz="4200" dirty="0" smtClean="0"/>
+              <a:t>rogramming </a:t>
+            </a:r>
+            <a:r>
+              <a:rPr lang="en-US" sz="4200" dirty="0" smtClean="0"/>
+              <a:t>model flexibility</a:t>
             </a:r>
           </a:p>
           <a:p>
@@ -5267,10 +5353,10 @@
               <a:buAutoNum type="arabicPeriod"/>
             </a:pPr>
             <a:r>
-              <a:rPr lang="en-US" sz="3900" b="1" dirty="0" smtClean="0"/>
+              <a:rPr lang="en-US" sz="4200" b="1" dirty="0" smtClean="0"/>
               <a:t>Flow consistent + coherence free</a:t>
             </a:r>
-            <a:endParaRPr lang="en-US" sz="3900" b="1" dirty="0"/>
+            <a:endParaRPr lang="en-US" sz="4200" b="1" dirty="0"/>
           </a:p>
           <a:p>
             <a:pPr marL="685800" lvl="1" indent="-342900">
@@ -5278,7 +5364,7 @@
               <a:buChar char="•"/>
             </a:pPr>
             <a:r>
-              <a:rPr lang="en-US" sz="3900" dirty="0" smtClean="0"/>
+              <a:rPr lang="en-US" sz="4200" dirty="0" smtClean="0"/>
               <a:t>Improve multicore scalability</a:t>
             </a:r>
           </a:p>
@@ -5493,7 +5579,7 @@
         <p:spPr>
           <a:xfrm>
             <a:off x="9454444" y="5948009"/>
-            <a:ext cx="8838566" cy="4970591"/>
+            <a:ext cx="8838566" cy="4739760"/>
           </a:xfrm>
           <a:prstGeom prst="rect">
             <a:avLst/>
@@ -5515,7 +5601,7 @@
               </a:rPr>
               <a:t>Motivation</a:t>
             </a:r>
-            <a:endParaRPr lang="en-US" sz="4000" dirty="0" smtClean="0">
+            <a:endParaRPr lang="en-US" sz="800" dirty="0" smtClean="0">
               <a:solidFill>
                 <a:srgbClr val="C00000"/>
               </a:solidFill>
@@ -5527,10 +5613,10 @@
               <a:buChar char="•"/>
             </a:pPr>
             <a:r>
-              <a:rPr lang="en-US" sz="3900" b="1" dirty="0" smtClean="0"/>
+              <a:rPr lang="en-US" sz="4200" b="1" dirty="0" smtClean="0"/>
               <a:t>10 GbE hardware is incredibly fast</a:t>
             </a:r>
-            <a:endParaRPr lang="en-US" sz="3900" b="1" dirty="0"/>
+            <a:endParaRPr lang="en-US" sz="4200" b="1" dirty="0"/>
           </a:p>
           <a:p>
             <a:pPr marL="914400" lvl="1" indent="-457200">
@@ -5538,9 +5624,22 @@
               <a:buChar char="•"/>
             </a:pPr>
             <a:r>
-              <a:rPr lang="en-US" sz="3900" dirty="0" smtClean="0"/>
-              <a:t>Over 10 million QPS w/ small pkts</a:t>
-            </a:r>
+              <a:rPr lang="en-US" sz="4200" dirty="0" smtClean="0"/>
+              <a:t>Over 10 </a:t>
+            </a:r>
+            <a:r>
+              <a:rPr lang="en-US" sz="4200" dirty="0" smtClean="0"/>
+              <a:t>M QPS </a:t>
+            </a:r>
+            <a:r>
+              <a:rPr lang="en-US" sz="4200" dirty="0" smtClean="0"/>
+              <a:t>w/ small </a:t>
+            </a:r>
+            <a:r>
+              <a:rPr lang="en-US" sz="4200" dirty="0" err="1" smtClean="0"/>
+              <a:t>pkts</a:t>
+            </a:r>
+            <a:endParaRPr lang="en-US" sz="4200" dirty="0" smtClean="0"/>
           </a:p>
           <a:p>
             <a:pPr marL="914400" lvl="1" indent="-457200">
@@ -5548,8 +5647,22 @@
               <a:buChar char="•"/>
             </a:pPr>
             <a:r>
-              <a:rPr lang="en-US" sz="3900" dirty="0" smtClean="0"/>
+              <a:rPr lang="en-US" sz="4200" dirty="0" smtClean="0"/>
               <a:t>10 – 20 μs latency in datacenters </a:t>
+            </a:r>
+          </a:p>
+          <a:p>
+            <a:pPr marL="457200" indent="-457200">
+              <a:buFont typeface="Arial"/>
+              <a:buChar char="•"/>
+            </a:pPr>
+            <a:r>
+              <a:rPr lang="en-US" sz="4200" b="1" dirty="0" smtClean="0"/>
+              <a:t>Systems </a:t>
+            </a:r>
+            <a:r>
+              <a:rPr lang="en-US" sz="4200" b="1" dirty="0" smtClean="0"/>
+              <a:t>software is a bottleneck</a:t>
             </a:r>
           </a:p>
           <a:p>
@@ -5558,32 +5671,7 @@
               <a:buChar char="•"/>
             </a:pPr>
             <a:r>
-              <a:rPr lang="en-US" sz="3900" dirty="0" smtClean="0"/>
-              <a:t>40 GbE is around the corner</a:t>
-            </a:r>
-            <a:endParaRPr lang="en-US" sz="3900" dirty="0"/>
-          </a:p>
-          <a:p>
-            <a:pPr marL="457200" indent="-457200">
-              <a:buFont typeface="Arial"/>
-              <a:buChar char="•"/>
-            </a:pPr>
-            <a:r>
-              <a:rPr lang="en-US" sz="3900" b="1" dirty="0"/>
-              <a:t>S</a:t>
-            </a:r>
-            <a:r>
-              <a:rPr lang="en-US" sz="3900" b="1" dirty="0" smtClean="0"/>
-              <a:t>ystems software is a bottleneck</a:t>
-            </a:r>
-          </a:p>
-          <a:p>
-            <a:pPr marL="914400" lvl="1" indent="-457200">
-              <a:buFont typeface="Arial"/>
-              <a:buChar char="•"/>
-            </a:pPr>
-            <a:r>
-              <a:rPr lang="en-US" sz="3900" dirty="0" smtClean="0"/>
+              <a:rPr lang="en-US" sz="4200" dirty="0" smtClean="0"/>
               <a:t>Limited throughput, latency jitter, poor multicore scalability</a:t>
             </a:r>
           </a:p>
@@ -5744,13 +5832,6 @@
                 </a:rPr>
                 <a:t>Linux 10GbE</a:t>
               </a:r>
-              <a:endParaRPr lang="en-US" sz="1800" dirty="0" smtClean="0">
-                <a:solidFill>
-                  <a:schemeClr val="tx1"/>
-                </a:solidFill>
-                <a:latin typeface="Times New Roman" panose="02020603050405020304" pitchFamily="18" charset="0"/>
-                <a:cs typeface="Times New Roman" panose="02020603050405020304" pitchFamily="18" charset="0"/>
-              </a:endParaRPr>
             </a:p>
             <a:p>
               <a:pPr>
@@ -5768,13 +5849,6 @@
                 </a:rPr>
                 <a:t>Linux 4x10GbE</a:t>
               </a:r>
-              <a:endParaRPr lang="en-US" sz="1800" dirty="0" smtClean="0">
-                <a:solidFill>
-                  <a:schemeClr val="tx1"/>
-                </a:solidFill>
-                <a:latin typeface="Times New Roman" panose="02020603050405020304" pitchFamily="18" charset="0"/>
-                <a:cs typeface="Times New Roman" panose="02020603050405020304" pitchFamily="18" charset="0"/>
-              </a:endParaRPr>
             </a:p>
             <a:p>
               <a:pPr>
@@ -6271,25 +6345,8 @@
                   <a:latin typeface="Times New Roman" panose="02020603050405020304" pitchFamily="18" charset="0"/>
                   <a:cs typeface="Times New Roman" panose="02020603050405020304" pitchFamily="18" charset="0"/>
                 </a:rPr>
-                <a:t>IX </a:t>
+                <a:t>IX (p99)</a:t>
               </a:r>
-              <a:r>
-                <a:rPr lang="en-US" sz="1800" dirty="0" smtClean="0">
-                  <a:solidFill>
-                    <a:schemeClr val="tx1"/>
-                  </a:solidFill>
-                  <a:latin typeface="Times New Roman" panose="02020603050405020304" pitchFamily="18" charset="0"/>
-                  <a:cs typeface="Times New Roman" panose="02020603050405020304" pitchFamily="18" charset="0"/>
-                </a:rPr>
-                <a:t>(p99)</a:t>
-              </a:r>
-              <a:endParaRPr lang="en-US" sz="1800" dirty="0" smtClean="0">
-                <a:solidFill>
-                  <a:schemeClr val="tx1"/>
-                </a:solidFill>
-                <a:latin typeface="Times New Roman" panose="02020603050405020304" pitchFamily="18" charset="0"/>
-                <a:cs typeface="Times New Roman" panose="02020603050405020304" pitchFamily="18" charset="0"/>
-              </a:endParaRPr>
             </a:p>
             <a:p>
               <a:pPr>
@@ -6305,25 +6362,8 @@
                   <a:latin typeface="Times New Roman" panose="02020603050405020304" pitchFamily="18" charset="0"/>
                   <a:cs typeface="Times New Roman" panose="02020603050405020304" pitchFamily="18" charset="0"/>
                 </a:rPr>
-                <a:t>IX </a:t>
+                <a:t>IX (avg)</a:t>
               </a:r>
-              <a:r>
-                <a:rPr lang="en-US" sz="1800" dirty="0" smtClean="0">
-                  <a:solidFill>
-                    <a:schemeClr val="tx1"/>
-                  </a:solidFill>
-                  <a:latin typeface="Times New Roman" panose="02020603050405020304" pitchFamily="18" charset="0"/>
-                  <a:cs typeface="Times New Roman" panose="02020603050405020304" pitchFamily="18" charset="0"/>
-                </a:rPr>
-                <a:t>(avg)</a:t>
-              </a:r>
-              <a:endParaRPr lang="en-US" sz="1800" dirty="0" smtClean="0">
-                <a:solidFill>
-                  <a:schemeClr val="tx1"/>
-                </a:solidFill>
-                <a:latin typeface="Times New Roman" panose="02020603050405020304" pitchFamily="18" charset="0"/>
-                <a:cs typeface="Times New Roman" panose="02020603050405020304" pitchFamily="18" charset="0"/>
-              </a:endParaRPr>
             </a:p>
             <a:p>
               <a:pPr>
@@ -6341,13 +6381,6 @@
                 </a:rPr>
                 <a:t>Linux (p99)</a:t>
               </a:r>
-              <a:endParaRPr lang="en-US" sz="1800" dirty="0" smtClean="0">
-                <a:solidFill>
-                  <a:schemeClr val="tx1"/>
-                </a:solidFill>
-                <a:latin typeface="Times New Roman" panose="02020603050405020304" pitchFamily="18" charset="0"/>
-                <a:cs typeface="Times New Roman" panose="02020603050405020304" pitchFamily="18" charset="0"/>
-              </a:endParaRPr>
             </a:p>
             <a:p>
               <a:pPr>
@@ -6365,13 +6398,6 @@
                 </a:rPr>
                 <a:t>Linux (avg)</a:t>
               </a:r>
-              <a:endParaRPr lang="en-US" sz="1800" dirty="0" smtClean="0">
-                <a:solidFill>
-                  <a:schemeClr val="tx1"/>
-                </a:solidFill>
-                <a:latin typeface="Times New Roman" panose="02020603050405020304" pitchFamily="18" charset="0"/>
-                <a:cs typeface="Times New Roman" panose="02020603050405020304" pitchFamily="18" charset="0"/>
-              </a:endParaRPr>
             </a:p>
           </p:txBody>
         </p:sp>
@@ -6768,25 +6794,8 @@
                   <a:latin typeface="Times New Roman" panose="02020603050405020304" pitchFamily="18" charset="0"/>
                   <a:cs typeface="Times New Roman" panose="02020603050405020304" pitchFamily="18" charset="0"/>
                 </a:rPr>
-                <a:t>IX </a:t>
+                <a:t>IX (p99)</a:t>
               </a:r>
-              <a:r>
-                <a:rPr lang="en-US" sz="1800" dirty="0" smtClean="0">
-                  <a:solidFill>
-                    <a:schemeClr val="tx1"/>
-                  </a:solidFill>
-                  <a:latin typeface="Times New Roman" panose="02020603050405020304" pitchFamily="18" charset="0"/>
-                  <a:cs typeface="Times New Roman" panose="02020603050405020304" pitchFamily="18" charset="0"/>
-                </a:rPr>
-                <a:t>(p99)</a:t>
-              </a:r>
-              <a:endParaRPr lang="en-US" sz="1800" dirty="0" smtClean="0">
-                <a:solidFill>
-                  <a:schemeClr val="tx1"/>
-                </a:solidFill>
-                <a:latin typeface="Times New Roman" panose="02020603050405020304" pitchFamily="18" charset="0"/>
-                <a:cs typeface="Times New Roman" panose="02020603050405020304" pitchFamily="18" charset="0"/>
-              </a:endParaRPr>
             </a:p>
             <a:p>
               <a:pPr>
@@ -6802,25 +6811,8 @@
                   <a:latin typeface="Times New Roman" panose="02020603050405020304" pitchFamily="18" charset="0"/>
                   <a:cs typeface="Times New Roman" panose="02020603050405020304" pitchFamily="18" charset="0"/>
                 </a:rPr>
-                <a:t>IX </a:t>
+                <a:t>IX (avg)</a:t>
               </a:r>
-              <a:r>
-                <a:rPr lang="en-US" sz="1800" dirty="0" smtClean="0">
-                  <a:solidFill>
-                    <a:schemeClr val="tx1"/>
-                  </a:solidFill>
-                  <a:latin typeface="Times New Roman" panose="02020603050405020304" pitchFamily="18" charset="0"/>
-                  <a:cs typeface="Times New Roman" panose="02020603050405020304" pitchFamily="18" charset="0"/>
-                </a:rPr>
-                <a:t>(avg)</a:t>
-              </a:r>
-              <a:endParaRPr lang="en-US" sz="1800" dirty="0" smtClean="0">
-                <a:solidFill>
-                  <a:schemeClr val="tx1"/>
-                </a:solidFill>
-                <a:latin typeface="Times New Roman" panose="02020603050405020304" pitchFamily="18" charset="0"/>
-                <a:cs typeface="Times New Roman" panose="02020603050405020304" pitchFamily="18" charset="0"/>
-              </a:endParaRPr>
             </a:p>
             <a:p>
               <a:pPr>
@@ -6838,13 +6830,6 @@
                 </a:rPr>
                 <a:t>Linux (p99)</a:t>
               </a:r>
-              <a:endParaRPr lang="en-US" sz="1800" dirty="0" smtClean="0">
-                <a:solidFill>
-                  <a:schemeClr val="tx1"/>
-                </a:solidFill>
-                <a:latin typeface="Times New Roman" panose="02020603050405020304" pitchFamily="18" charset="0"/>
-                <a:cs typeface="Times New Roman" panose="02020603050405020304" pitchFamily="18" charset="0"/>
-              </a:endParaRPr>
             </a:p>
             <a:p>
               <a:pPr>
@@ -6862,13 +6847,6 @@
                 </a:rPr>
                 <a:t>Linux (avg)</a:t>
               </a:r>
-              <a:endParaRPr lang="en-US" sz="1800" dirty="0" smtClean="0">
-                <a:solidFill>
-                  <a:schemeClr val="tx1"/>
-                </a:solidFill>
-                <a:latin typeface="Times New Roman" panose="02020603050405020304" pitchFamily="18" charset="0"/>
-                <a:cs typeface="Times New Roman" panose="02020603050405020304" pitchFamily="18" charset="0"/>
-              </a:endParaRPr>
             </a:p>
           </p:txBody>
         </p:sp>
@@ -7212,7 +7190,7 @@
   <p:timing>
     <p:tnLst>
       <p:par>
-        <p:cTn id="1" dur="indefinite" restart="never" nodeType="tmRoot"/>
+        <p:cTn xmlns:p14="http://schemas.microsoft.com/office/powerpoint/2010/main" id="1" dur="indefinite" restart="never" nodeType="tmRoot"/>
       </p:par>
     </p:tnLst>
   </p:timing>

</xml_diff>